<commit_message>
Added slidable delete button
</commit_message>
<xml_diff>
--- a/Teamer.pptx
+++ b/Teamer.pptx
@@ -25229,7 +25229,7 @@
         <p:spPr>
           <a:xfrm>
             <a:off x="1809750" y="1111975"/>
-            <a:ext cx="6953250" cy="2031325"/>
+            <a:ext cx="6953250" cy="2308324"/>
           </a:xfrm>
           <a:prstGeom prst="rect">
             <a:avLst/>
@@ -25265,6 +25265,16 @@
             <a:r>
               <a:rPr lang="de-DE"/>
               <a:t>Screen Stats erstellen </a:t>
+            </a:r>
+          </a:p>
+          <a:p>
+            <a:pPr marL="285750" indent="-285750">
+              <a:buFontTx/>
+              <a:buChar char="-"/>
+            </a:pPr>
+            <a:r>
+              <a:rPr lang="de-DE"/>
+              <a:t>SplashScreen</a:t>
             </a:r>
           </a:p>
           <a:p>

</xml_diff>

<commit_message>
Changed splashscreen and cleand App-Icon
</commit_message>
<xml_diff>
--- a/Teamer.pptx
+++ b/Teamer.pptx
@@ -223,7 +223,7 @@
           <a:p>
             <a:fld id="{A475BD0F-648E-467A-A636-69955938710C}" type="datetimeFigureOut">
               <a:rPr lang="de-DE" smtClean="0"/>
-              <a:t>09.02.2025</a:t>
+              <a:t>28.05.2025</a:t>
             </a:fld>
             <a:endParaRPr lang="de-DE"/>
           </a:p>
@@ -400,7 +400,7 @@
           <a:p>
             <a:fld id="{5C29B23B-13F4-4796-97E3-381DEB9A55AC}" type="datetimeFigureOut">
               <a:rPr lang="de-DE" smtClean="0"/>
-              <a:t>09.02.2025</a:t>
+              <a:t>28.05.2025</a:t>
             </a:fld>
             <a:endParaRPr lang="de-DE"/>
           </a:p>
@@ -1114,7 +1114,7 @@
           <a:p>
             <a:fld id="{79C2F003-99E1-48AA-97ED-3A7A4F8A3DF4}" type="datetimeFigureOut">
               <a:rPr lang="de-DE" smtClean="0"/>
-              <a:t>09.02.2025</a:t>
+              <a:t>28.05.2025</a:t>
             </a:fld>
             <a:endParaRPr lang="de-DE"/>
           </a:p>
@@ -1312,7 +1312,7 @@
           <a:p>
             <a:fld id="{79C2F003-99E1-48AA-97ED-3A7A4F8A3DF4}" type="datetimeFigureOut">
               <a:rPr lang="de-DE" smtClean="0"/>
-              <a:t>09.02.2025</a:t>
+              <a:t>28.05.2025</a:t>
             </a:fld>
             <a:endParaRPr lang="de-DE"/>
           </a:p>
@@ -1520,7 +1520,7 @@
           <a:p>
             <a:fld id="{79C2F003-99E1-48AA-97ED-3A7A4F8A3DF4}" type="datetimeFigureOut">
               <a:rPr lang="de-DE" smtClean="0"/>
-              <a:t>09.02.2025</a:t>
+              <a:t>28.05.2025</a:t>
             </a:fld>
             <a:endParaRPr lang="de-DE"/>
           </a:p>
@@ -1718,7 +1718,7 @@
           <a:p>
             <a:fld id="{79C2F003-99E1-48AA-97ED-3A7A4F8A3DF4}" type="datetimeFigureOut">
               <a:rPr lang="de-DE" smtClean="0"/>
-              <a:t>09.02.2025</a:t>
+              <a:t>28.05.2025</a:t>
             </a:fld>
             <a:endParaRPr lang="de-DE"/>
           </a:p>
@@ -1993,7 +1993,7 @@
           <a:p>
             <a:fld id="{79C2F003-99E1-48AA-97ED-3A7A4F8A3DF4}" type="datetimeFigureOut">
               <a:rPr lang="de-DE" smtClean="0"/>
-              <a:t>09.02.2025</a:t>
+              <a:t>28.05.2025</a:t>
             </a:fld>
             <a:endParaRPr lang="de-DE"/>
           </a:p>
@@ -2258,7 +2258,7 @@
           <a:p>
             <a:fld id="{79C2F003-99E1-48AA-97ED-3A7A4F8A3DF4}" type="datetimeFigureOut">
               <a:rPr lang="de-DE" smtClean="0"/>
-              <a:t>09.02.2025</a:t>
+              <a:t>28.05.2025</a:t>
             </a:fld>
             <a:endParaRPr lang="de-DE"/>
           </a:p>
@@ -2670,7 +2670,7 @@
           <a:p>
             <a:fld id="{79C2F003-99E1-48AA-97ED-3A7A4F8A3DF4}" type="datetimeFigureOut">
               <a:rPr lang="de-DE" smtClean="0"/>
-              <a:t>09.02.2025</a:t>
+              <a:t>28.05.2025</a:t>
             </a:fld>
             <a:endParaRPr lang="de-DE"/>
           </a:p>
@@ -2811,7 +2811,7 @@
           <a:p>
             <a:fld id="{79C2F003-99E1-48AA-97ED-3A7A4F8A3DF4}" type="datetimeFigureOut">
               <a:rPr lang="de-DE" smtClean="0"/>
-              <a:t>09.02.2025</a:t>
+              <a:t>28.05.2025</a:t>
             </a:fld>
             <a:endParaRPr lang="de-DE"/>
           </a:p>
@@ -2924,7 +2924,7 @@
           <a:p>
             <a:fld id="{79C2F003-99E1-48AA-97ED-3A7A4F8A3DF4}" type="datetimeFigureOut">
               <a:rPr lang="de-DE" smtClean="0"/>
-              <a:t>09.02.2025</a:t>
+              <a:t>28.05.2025</a:t>
             </a:fld>
             <a:endParaRPr lang="de-DE"/>
           </a:p>
@@ -3235,7 +3235,7 @@
           <a:p>
             <a:fld id="{79C2F003-99E1-48AA-97ED-3A7A4F8A3DF4}" type="datetimeFigureOut">
               <a:rPr lang="de-DE" smtClean="0"/>
-              <a:t>09.02.2025</a:t>
+              <a:t>28.05.2025</a:t>
             </a:fld>
             <a:endParaRPr lang="de-DE"/>
           </a:p>
@@ -3523,7 +3523,7 @@
           <a:p>
             <a:fld id="{79C2F003-99E1-48AA-97ED-3A7A4F8A3DF4}" type="datetimeFigureOut">
               <a:rPr lang="de-DE" smtClean="0"/>
-              <a:t>09.02.2025</a:t>
+              <a:t>28.05.2025</a:t>
             </a:fld>
             <a:endParaRPr lang="de-DE"/>
           </a:p>
@@ -3764,7 +3764,7 @@
           <a:p>
             <a:fld id="{79C2F003-99E1-48AA-97ED-3A7A4F8A3DF4}" type="datetimeFigureOut">
               <a:rPr lang="de-DE" smtClean="0"/>
-              <a:t>09.02.2025</a:t>
+              <a:t>28.05.2025</a:t>
             </a:fld>
             <a:endParaRPr lang="de-DE"/>
           </a:p>
@@ -5250,96 +5250,6 @@
       </p:sp>
       <p:sp>
         <p:nvSpPr>
-          <p:cNvPr id="15" name="Rechteck: abgerundete Ecken 14">
-            <a:extLst>
-              <a:ext uri="{FF2B5EF4-FFF2-40B4-BE49-F238E27FC236}">
-                <a16:creationId xmlns:a16="http://schemas.microsoft.com/office/drawing/2014/main" id="{BB17BD24-9E7F-82DE-CBDC-7ABE9B4BF694}"/>
-              </a:ext>
-            </a:extLst>
-          </p:cNvPr>
-          <p:cNvSpPr>
-            <a:spLocks noChangeAspect="1"/>
-          </p:cNvSpPr>
-          <p:nvPr/>
-        </p:nvSpPr>
-        <p:spPr>
-          <a:xfrm>
-            <a:off x="2066806" y="2061000"/>
-            <a:ext cx="2736000" cy="2736000"/>
-          </a:xfrm>
-          <a:prstGeom prst="roundRect">
-            <a:avLst/>
-          </a:prstGeom>
-          <a:solidFill>
-            <a:srgbClr val="262626"/>
-          </a:solidFill>
-          <a:ln>
-            <a:noFill/>
-          </a:ln>
-        </p:spPr>
-        <p:style>
-          <a:lnRef idx="2">
-            <a:schemeClr val="accent1">
-              <a:shade val="15000"/>
-            </a:schemeClr>
-          </a:lnRef>
-          <a:fillRef idx="1">
-            <a:schemeClr val="accent1"/>
-          </a:fillRef>
-          <a:effectRef idx="0">
-            <a:schemeClr val="accent1"/>
-          </a:effectRef>
-          <a:fontRef idx="minor">
-            <a:schemeClr val="lt1"/>
-          </a:fontRef>
-        </p:style>
-        <p:txBody>
-          <a:bodyPr rtlCol="0" anchor="ctr"/>
-          <a:lstStyle/>
-          <a:p>
-            <a:pPr algn="ctr"/>
-            <a:endParaRPr lang="de-DE"/>
-          </a:p>
-        </p:txBody>
-      </p:sp>
-      <p:pic>
-        <p:nvPicPr>
-          <p:cNvPr id="13" name="Grafik 12" descr="Ein Bild, das Ball, Golf, Golfball, Sportausrüstung enthält.&#10;&#10;Automatisch generierte Beschreibung">
-            <a:extLst>
-              <a:ext uri="{FF2B5EF4-FFF2-40B4-BE49-F238E27FC236}">
-                <a16:creationId xmlns:a16="http://schemas.microsoft.com/office/drawing/2014/main" id="{27322DB1-A781-82FC-42FE-85C9FC48EFE8}"/>
-              </a:ext>
-            </a:extLst>
-          </p:cNvPr>
-          <p:cNvPicPr>
-            <a:picLocks noChangeAspect="1"/>
-          </p:cNvPicPr>
-          <p:nvPr/>
-        </p:nvPicPr>
-        <p:blipFill>
-          <a:blip r:embed="rId2">
-            <a:extLst>
-              <a:ext uri="{28A0092B-C50C-407E-A947-70E740481C1C}">
-                <a14:useLocalDpi xmlns:a14="http://schemas.microsoft.com/office/drawing/2010/main" val="0"/>
-              </a:ext>
-            </a:extLst>
-          </a:blip>
-          <a:stretch>
-            <a:fillRect/>
-          </a:stretch>
-        </p:blipFill>
-        <p:spPr>
-          <a:xfrm>
-            <a:off x="2456478" y="2451138"/>
-            <a:ext cx="1956656" cy="1956656"/>
-          </a:xfrm>
-          <a:prstGeom prst="rect">
-            <a:avLst/>
-          </a:prstGeom>
-        </p:spPr>
-      </p:pic>
-      <p:sp>
-        <p:nvSpPr>
           <p:cNvPr id="23" name="Textfeld 22">
             <a:extLst>
               <a:ext uri="{FF2B5EF4-FFF2-40B4-BE49-F238E27FC236}">
@@ -5389,6 +5299,357 @@
           </a:p>
         </p:txBody>
       </p:sp>
+      <p:pic>
+        <p:nvPicPr>
+          <p:cNvPr id="24" name="Grafik 23" descr="Ein Bild, das Ball, Golf, Golfball, Sportausrüstung enthält.&#10;&#10;Automatisch generierte Beschreibung">
+            <a:extLst>
+              <a:ext uri="{FF2B5EF4-FFF2-40B4-BE49-F238E27FC236}">
+                <a16:creationId xmlns:a16="http://schemas.microsoft.com/office/drawing/2014/main" id="{3B0DBD2F-EBCB-2DEF-8A9F-E0959DB46A92}"/>
+              </a:ext>
+            </a:extLst>
+          </p:cNvPr>
+          <p:cNvPicPr>
+            <a:picLocks noChangeAspect="1"/>
+          </p:cNvPicPr>
+          <p:nvPr/>
+        </p:nvPicPr>
+        <p:blipFill>
+          <a:blip r:embed="rId2">
+            <a:extLst>
+              <a:ext uri="{28A0092B-C50C-407E-A947-70E740481C1C}">
+                <a14:useLocalDpi xmlns:a14="http://schemas.microsoft.com/office/drawing/2010/main" val="0"/>
+              </a:ext>
+            </a:extLst>
+          </a:blip>
+          <a:srcRect l="15001" t="84915" r="15001" b="567"/>
+          <a:stretch>
+            <a:fillRect/>
+          </a:stretch>
+        </p:blipFill>
+        <p:spPr>
+          <a:xfrm>
+            <a:off x="7395000" y="4102470"/>
+            <a:ext cx="1369602" cy="284077"/>
+          </a:xfrm>
+          <a:custGeom>
+            <a:avLst/>
+            <a:gdLst>
+              <a:gd name="connsiteX0" fmla="*/ 0 w 1369602"/>
+              <a:gd name="connsiteY0" fmla="*/ 0 h 284077"/>
+              <a:gd name="connsiteX1" fmla="*/ 141636 w 1369602"/>
+              <a:gd name="connsiteY1" fmla="*/ 116859 h 284077"/>
+              <a:gd name="connsiteX2" fmla="*/ 684801 w 1369602"/>
+              <a:gd name="connsiteY2" fmla="*/ 282773 h 284077"/>
+              <a:gd name="connsiteX3" fmla="*/ 1227966 w 1369602"/>
+              <a:gd name="connsiteY3" fmla="*/ 116859 h 284077"/>
+              <a:gd name="connsiteX4" fmla="*/ 1369602 w 1369602"/>
+              <a:gd name="connsiteY4" fmla="*/ 0 h 284077"/>
+              <a:gd name="connsiteX5" fmla="*/ 1369071 w 1369602"/>
+              <a:gd name="connsiteY5" fmla="*/ 643 h 284077"/>
+              <a:gd name="connsiteX6" fmla="*/ 684801 w 1369602"/>
+              <a:gd name="connsiteY6" fmla="*/ 284077 h 284077"/>
+              <a:gd name="connsiteX7" fmla="*/ 531 w 1369602"/>
+              <a:gd name="connsiteY7" fmla="*/ 643 h 284077"/>
+              <a:gd name="connsiteX8" fmla="*/ 0 w 1369602"/>
+              <a:gd name="connsiteY8" fmla="*/ 0 h 284077"/>
+            </a:gdLst>
+            <a:ahLst/>
+            <a:cxnLst>
+              <a:cxn ang="0">
+                <a:pos x="connsiteX0" y="connsiteY0"/>
+              </a:cxn>
+              <a:cxn ang="0">
+                <a:pos x="connsiteX1" y="connsiteY1"/>
+              </a:cxn>
+              <a:cxn ang="0">
+                <a:pos x="connsiteX2" y="connsiteY2"/>
+              </a:cxn>
+              <a:cxn ang="0">
+                <a:pos x="connsiteX3" y="connsiteY3"/>
+              </a:cxn>
+              <a:cxn ang="0">
+                <a:pos x="connsiteX4" y="connsiteY4"/>
+              </a:cxn>
+              <a:cxn ang="0">
+                <a:pos x="connsiteX5" y="connsiteY5"/>
+              </a:cxn>
+              <a:cxn ang="0">
+                <a:pos x="connsiteX6" y="connsiteY6"/>
+              </a:cxn>
+              <a:cxn ang="0">
+                <a:pos x="connsiteX7" y="connsiteY7"/>
+              </a:cxn>
+              <a:cxn ang="0">
+                <a:pos x="connsiteX8" y="connsiteY8"/>
+              </a:cxn>
+            </a:cxnLst>
+            <a:rect l="l" t="t" r="r" b="b"/>
+            <a:pathLst>
+              <a:path w="1369602" h="284077">
+                <a:moveTo>
+                  <a:pt x="0" y="0"/>
+                </a:moveTo>
+                <a:lnTo>
+                  <a:pt x="141636" y="116859"/>
+                </a:lnTo>
+                <a:cubicBezTo>
+                  <a:pt x="296686" y="221609"/>
+                  <a:pt x="483601" y="282773"/>
+                  <a:pt x="684801" y="282773"/>
+                </a:cubicBezTo>
+                <a:cubicBezTo>
+                  <a:pt x="886002" y="282773"/>
+                  <a:pt x="1072916" y="221609"/>
+                  <a:pt x="1227966" y="116859"/>
+                </a:cubicBezTo>
+                <a:lnTo>
+                  <a:pt x="1369602" y="0"/>
+                </a:lnTo>
+                <a:lnTo>
+                  <a:pt x="1369071" y="643"/>
+                </a:lnTo>
+                <a:cubicBezTo>
+                  <a:pt x="1193951" y="175763"/>
+                  <a:pt x="952025" y="284077"/>
+                  <a:pt x="684801" y="284077"/>
+                </a:cubicBezTo>
+                <a:cubicBezTo>
+                  <a:pt x="417577" y="284077"/>
+                  <a:pt x="175651" y="175763"/>
+                  <a:pt x="531" y="643"/>
+                </a:cubicBezTo>
+                <a:lnTo>
+                  <a:pt x="0" y="0"/>
+                </a:lnTo>
+                <a:close/>
+              </a:path>
+            </a:pathLst>
+          </a:custGeom>
+        </p:spPr>
+      </p:pic>
+      <p:grpSp>
+        <p:nvGrpSpPr>
+          <p:cNvPr id="26" name="Gruppieren 25">
+            <a:extLst>
+              <a:ext uri="{FF2B5EF4-FFF2-40B4-BE49-F238E27FC236}">
+                <a16:creationId xmlns:a16="http://schemas.microsoft.com/office/drawing/2014/main" id="{556347DC-64A3-6E88-7C3E-39543FDF5BB8}"/>
+              </a:ext>
+            </a:extLst>
+          </p:cNvPr>
+          <p:cNvGrpSpPr/>
+          <p:nvPr/>
+        </p:nvGrpSpPr>
+        <p:grpSpPr>
+          <a:xfrm>
+            <a:off x="2066806" y="2061000"/>
+            <a:ext cx="2736000" cy="2736000"/>
+            <a:chOff x="2066806" y="2061000"/>
+            <a:chExt cx="2736000" cy="2736000"/>
+          </a:xfrm>
+        </p:grpSpPr>
+        <p:sp>
+          <p:nvSpPr>
+            <p:cNvPr id="15" name="Rechteck: abgerundete Ecken 14">
+              <a:extLst>
+                <a:ext uri="{FF2B5EF4-FFF2-40B4-BE49-F238E27FC236}">
+                  <a16:creationId xmlns:a16="http://schemas.microsoft.com/office/drawing/2014/main" id="{BB17BD24-9E7F-82DE-CBDC-7ABE9B4BF694}"/>
+                </a:ext>
+              </a:extLst>
+            </p:cNvPr>
+            <p:cNvSpPr>
+              <a:spLocks noChangeAspect="1"/>
+            </p:cNvSpPr>
+            <p:nvPr/>
+          </p:nvSpPr>
+          <p:spPr>
+            <a:xfrm>
+              <a:off x="2066806" y="2061000"/>
+              <a:ext cx="2736000" cy="2736000"/>
+            </a:xfrm>
+            <a:prstGeom prst="roundRect">
+              <a:avLst/>
+            </a:prstGeom>
+            <a:solidFill>
+              <a:srgbClr val="262626"/>
+            </a:solidFill>
+            <a:ln>
+              <a:noFill/>
+            </a:ln>
+          </p:spPr>
+          <p:style>
+            <a:lnRef idx="2">
+              <a:schemeClr val="accent1">
+                <a:shade val="15000"/>
+              </a:schemeClr>
+            </a:lnRef>
+            <a:fillRef idx="1">
+              <a:schemeClr val="accent1"/>
+            </a:fillRef>
+            <a:effectRef idx="0">
+              <a:schemeClr val="accent1"/>
+            </a:effectRef>
+            <a:fontRef idx="minor">
+              <a:schemeClr val="lt1"/>
+            </a:fontRef>
+          </p:style>
+          <p:txBody>
+            <a:bodyPr rtlCol="0" anchor="ctr"/>
+            <a:lstStyle/>
+            <a:p>
+              <a:pPr algn="ctr"/>
+              <a:endParaRPr lang="de-DE"/>
+            </a:p>
+          </p:txBody>
+        </p:sp>
+        <p:pic>
+          <p:nvPicPr>
+            <p:cNvPr id="19" name="Grafik 18" descr="Ein Bild, das Ball, Golf, Golfball, Sportausrüstung enthält.&#10;&#10;Automatisch generierte Beschreibung">
+              <a:extLst>
+                <a:ext uri="{FF2B5EF4-FFF2-40B4-BE49-F238E27FC236}">
+                  <a16:creationId xmlns:a16="http://schemas.microsoft.com/office/drawing/2014/main" id="{0B61A820-9523-F996-B808-DF3315754A0F}"/>
+                </a:ext>
+              </a:extLst>
+            </p:cNvPr>
+            <p:cNvPicPr>
+              <a:picLocks noChangeAspect="1"/>
+            </p:cNvPicPr>
+            <p:nvPr/>
+          </p:nvPicPr>
+          <p:blipFill>
+            <a:blip r:embed="rId2">
+              <a:extLst>
+                <a:ext uri="{28A0092B-C50C-407E-A947-70E740481C1C}">
+                  <a14:useLocalDpi xmlns:a14="http://schemas.microsoft.com/office/drawing/2010/main" val="0"/>
+                </a:ext>
+              </a:extLst>
+            </a:blip>
+            <a:srcRect l="543" t="519" r="543" b="634"/>
+            <a:stretch>
+              <a:fillRect/>
+            </a:stretch>
+          </p:blipFill>
+          <p:spPr>
+            <a:xfrm>
+              <a:off x="2467102" y="2461948"/>
+              <a:ext cx="1935408" cy="1934104"/>
+            </a:xfrm>
+            <a:custGeom>
+              <a:avLst/>
+              <a:gdLst>
+                <a:gd name="connsiteX0" fmla="*/ 967704 w 1935408"/>
+                <a:gd name="connsiteY0" fmla="*/ 0 h 1934104"/>
+                <a:gd name="connsiteX1" fmla="*/ 1935408 w 1935408"/>
+                <a:gd name="connsiteY1" fmla="*/ 967704 h 1934104"/>
+                <a:gd name="connsiteX2" fmla="*/ 1770139 w 1935408"/>
+                <a:gd name="connsiteY2" fmla="*/ 1508756 h 1934104"/>
+                <a:gd name="connsiteX3" fmla="*/ 1652505 w 1935408"/>
+                <a:gd name="connsiteY3" fmla="*/ 1651331 h 1934104"/>
+                <a:gd name="connsiteX4" fmla="*/ 1510869 w 1935408"/>
+                <a:gd name="connsiteY4" fmla="*/ 1768190 h 1934104"/>
+                <a:gd name="connsiteX5" fmla="*/ 967704 w 1935408"/>
+                <a:gd name="connsiteY5" fmla="*/ 1934104 h 1934104"/>
+                <a:gd name="connsiteX6" fmla="*/ 424539 w 1935408"/>
+                <a:gd name="connsiteY6" fmla="*/ 1768190 h 1934104"/>
+                <a:gd name="connsiteX7" fmla="*/ 282903 w 1935408"/>
+                <a:gd name="connsiteY7" fmla="*/ 1651331 h 1934104"/>
+                <a:gd name="connsiteX8" fmla="*/ 165269 w 1935408"/>
+                <a:gd name="connsiteY8" fmla="*/ 1508756 h 1934104"/>
+                <a:gd name="connsiteX9" fmla="*/ 0 w 1935408"/>
+                <a:gd name="connsiteY9" fmla="*/ 967704 h 1934104"/>
+                <a:gd name="connsiteX10" fmla="*/ 967704 w 1935408"/>
+                <a:gd name="connsiteY10" fmla="*/ 0 h 1934104"/>
+              </a:gdLst>
+              <a:ahLst/>
+              <a:cxnLst>
+                <a:cxn ang="0">
+                  <a:pos x="connsiteX0" y="connsiteY0"/>
+                </a:cxn>
+                <a:cxn ang="0">
+                  <a:pos x="connsiteX1" y="connsiteY1"/>
+                </a:cxn>
+                <a:cxn ang="0">
+                  <a:pos x="connsiteX2" y="connsiteY2"/>
+                </a:cxn>
+                <a:cxn ang="0">
+                  <a:pos x="connsiteX3" y="connsiteY3"/>
+                </a:cxn>
+                <a:cxn ang="0">
+                  <a:pos x="connsiteX4" y="connsiteY4"/>
+                </a:cxn>
+                <a:cxn ang="0">
+                  <a:pos x="connsiteX5" y="connsiteY5"/>
+                </a:cxn>
+                <a:cxn ang="0">
+                  <a:pos x="connsiteX6" y="connsiteY6"/>
+                </a:cxn>
+                <a:cxn ang="0">
+                  <a:pos x="connsiteX7" y="connsiteY7"/>
+                </a:cxn>
+                <a:cxn ang="0">
+                  <a:pos x="connsiteX8" y="connsiteY8"/>
+                </a:cxn>
+                <a:cxn ang="0">
+                  <a:pos x="connsiteX9" y="connsiteY9"/>
+                </a:cxn>
+                <a:cxn ang="0">
+                  <a:pos x="connsiteX10" y="connsiteY10"/>
+                </a:cxn>
+              </a:cxnLst>
+              <a:rect l="l" t="t" r="r" b="b"/>
+              <a:pathLst>
+                <a:path w="1935408" h="1934104">
+                  <a:moveTo>
+                    <a:pt x="967704" y="0"/>
+                  </a:moveTo>
+                  <a:cubicBezTo>
+                    <a:pt x="1502152" y="0"/>
+                    <a:pt x="1935408" y="433256"/>
+                    <a:pt x="1935408" y="967704"/>
+                  </a:cubicBezTo>
+                  <a:cubicBezTo>
+                    <a:pt x="1935408" y="1168122"/>
+                    <a:pt x="1874481" y="1354310"/>
+                    <a:pt x="1770139" y="1508756"/>
+                  </a:cubicBezTo>
+                  <a:lnTo>
+                    <a:pt x="1652505" y="1651331"/>
+                  </a:lnTo>
+                  <a:lnTo>
+                    <a:pt x="1510869" y="1768190"/>
+                  </a:lnTo>
+                  <a:cubicBezTo>
+                    <a:pt x="1355819" y="1872940"/>
+                    <a:pt x="1168905" y="1934104"/>
+                    <a:pt x="967704" y="1934104"/>
+                  </a:cubicBezTo>
+                  <a:cubicBezTo>
+                    <a:pt x="766504" y="1934104"/>
+                    <a:pt x="579589" y="1872940"/>
+                    <a:pt x="424539" y="1768190"/>
+                  </a:cubicBezTo>
+                  <a:lnTo>
+                    <a:pt x="282903" y="1651331"/>
+                  </a:lnTo>
+                  <a:lnTo>
+                    <a:pt x="165269" y="1508756"/>
+                  </a:lnTo>
+                  <a:cubicBezTo>
+                    <a:pt x="60927" y="1354310"/>
+                    <a:pt x="0" y="1168122"/>
+                    <a:pt x="0" y="967704"/>
+                  </a:cubicBezTo>
+                  <a:cubicBezTo>
+                    <a:pt x="0" y="433256"/>
+                    <a:pt x="433256" y="0"/>
+                    <a:pt x="967704" y="0"/>
+                  </a:cubicBezTo>
+                  <a:close/>
+                </a:path>
+              </a:pathLst>
+            </a:custGeom>
+          </p:spPr>
+        </p:pic>
+      </p:grpSp>
     </p:spTree>
     <p:extLst>
       <p:ext uri="{BB962C8B-B14F-4D97-AF65-F5344CB8AC3E}">

</xml_diff>